<commit_message>
add xmind, update ppt, update demo
</commit_message>
<xml_diff>
--- a/AnimationSkillShare/动画实用技巧.pptx
+++ b/AnimationSkillShare/动画实用技巧.pptx
@@ -5,11 +5,16 @@
     <p:sldMasterId id="2147483648" r:id="rId1"/>
   </p:sldMasterIdLst>
   <p:notesMasterIdLst>
-    <p:notesMasterId r:id="rId4"/>
+    <p:notesMasterId r:id="rId9"/>
   </p:notesMasterIdLst>
   <p:sldIdLst>
     <p:sldId id="256" r:id="rId2"/>
-    <p:sldId id="257" r:id="rId3"/>
+    <p:sldId id="263" r:id="rId3"/>
+    <p:sldId id="257" r:id="rId4"/>
+    <p:sldId id="261" r:id="rId5"/>
+    <p:sldId id="260" r:id="rId6"/>
+    <p:sldId id="258" r:id="rId7"/>
+    <p:sldId id="259" r:id="rId8"/>
   </p:sldIdLst>
   <p:sldSz cx="12192000" cy="6858000"/>
   <p:notesSz cx="6858000" cy="9144000"/>
@@ -108,6 +113,11 @@
       </a:defRPr>
     </a:lvl9pPr>
   </p:defaultTextStyle>
+  <p:extLst>
+    <p:ext uri="{EFAFB233-063F-42B5-8137-9DF3F51BA10A}">
+      <p15:sldGuideLst xmlns:p15="http://schemas.microsoft.com/office/powerpoint/2012/main"/>
+    </p:ext>
+  </p:extLst>
 </p:presentation>
 </file>
 
@@ -193,7 +203,7 @@
           <a:p>
             <a:fld id="{433AAF85-9BEC-EE4B-A2D6-629E21E2BD86}" type="datetimeFigureOut">
               <a:rPr kumimoji="1" lang="zh-CN" altLang="en-US" smtClean="0"/>
-              <a:t>15/10/24</a:t>
+              <a:t>15/10/26</a:t>
             </a:fld>
             <a:endParaRPr kumimoji="1" lang="zh-CN" altLang="en-US"/>
           </a:p>
@@ -505,6 +515,10 @@
           <a:bodyPr/>
           <a:lstStyle/>
           <a:p>
+            <a:r>
+              <a:rPr kumimoji="1" lang="zh-CN" altLang="en-US" dirty="0" smtClean="0"/>
+              <a:t>尽量讲大家平时接触得比较少的</a:t>
+            </a:r>
             <a:endParaRPr kumimoji="1" lang="zh-CN" altLang="en-US" dirty="0"/>
           </a:p>
         </p:txBody>
@@ -536,6 +550,206 @@
     <p:extLst>
       <p:ext uri="{BB962C8B-B14F-4D97-AF65-F5344CB8AC3E}">
         <p14:creationId xmlns:p14="http://schemas.microsoft.com/office/powerpoint/2010/main" val="1827336327"/>
+      </p:ext>
+    </p:extLst>
+  </p:cSld>
+  <p:clrMapOvr>
+    <a:masterClrMapping/>
+  </p:clrMapOvr>
+</p:notes>
+</file>
+
+<file path=ppt/notesSlides/notesSlide2.xml><?xml version="1.0" encoding="utf-8"?>
+<p:notes xmlns:a="http://schemas.openxmlformats.org/drawingml/2006/main" xmlns:r="http://schemas.openxmlformats.org/officeDocument/2006/relationships" xmlns:p="http://schemas.openxmlformats.org/presentationml/2006/main">
+  <p:cSld>
+    <p:spTree>
+      <p:nvGrpSpPr>
+        <p:cNvPr id="1" name=""/>
+        <p:cNvGrpSpPr/>
+        <p:nvPr/>
+      </p:nvGrpSpPr>
+      <p:grpSpPr>
+        <a:xfrm>
+          <a:off x="0" y="0"/>
+          <a:ext cx="0" cy="0"/>
+          <a:chOff x="0" y="0"/>
+          <a:chExt cx="0" cy="0"/>
+        </a:xfrm>
+      </p:grpSpPr>
+      <p:sp>
+        <p:nvSpPr>
+          <p:cNvPr id="2" name="幻灯片图像占位符 1"/>
+          <p:cNvSpPr>
+            <a:spLocks noGrp="1" noRot="1" noChangeAspect="1"/>
+          </p:cNvSpPr>
+          <p:nvPr>
+            <p:ph type="sldImg"/>
+          </p:nvPr>
+        </p:nvSpPr>
+        <p:spPr/>
+      </p:sp>
+      <p:sp>
+        <p:nvSpPr>
+          <p:cNvPr id="3" name="备注占位符 2"/>
+          <p:cNvSpPr>
+            <a:spLocks noGrp="1"/>
+          </p:cNvSpPr>
+          <p:nvPr>
+            <p:ph type="body" idx="1"/>
+          </p:nvPr>
+        </p:nvSpPr>
+        <p:spPr/>
+        <p:txBody>
+          <a:bodyPr/>
+          <a:lstStyle/>
+          <a:p>
+            <a:endParaRPr kumimoji="1" lang="zh-CN" altLang="en-US" dirty="0" smtClean="0"/>
+          </a:p>
+        </p:txBody>
+      </p:sp>
+      <p:sp>
+        <p:nvSpPr>
+          <p:cNvPr id="4" name="幻灯片编号占位符 3"/>
+          <p:cNvSpPr>
+            <a:spLocks noGrp="1"/>
+          </p:cNvSpPr>
+          <p:nvPr>
+            <p:ph type="sldNum" sz="quarter" idx="10"/>
+          </p:nvPr>
+        </p:nvSpPr>
+        <p:spPr/>
+        <p:txBody>
+          <a:bodyPr/>
+          <a:lstStyle/>
+          <a:p>
+            <a:fld id="{53190343-A285-E444-9B8B-A03A0DB5BFEC}" type="slidenum">
+              <a:rPr kumimoji="1" lang="zh-CN" altLang="en-US" smtClean="0"/>
+              <a:t>2</a:t>
+            </a:fld>
+            <a:endParaRPr kumimoji="1" lang="zh-CN" altLang="en-US"/>
+          </a:p>
+        </p:txBody>
+      </p:sp>
+    </p:spTree>
+    <p:extLst>
+      <p:ext uri="{BB962C8B-B14F-4D97-AF65-F5344CB8AC3E}">
+        <p14:creationId xmlns:p14="http://schemas.microsoft.com/office/powerpoint/2010/main" val="135497281"/>
+      </p:ext>
+    </p:extLst>
+  </p:cSld>
+  <p:clrMapOvr>
+    <a:masterClrMapping/>
+  </p:clrMapOvr>
+</p:notes>
+</file>
+
+<file path=ppt/notesSlides/notesSlide3.xml><?xml version="1.0" encoding="utf-8"?>
+<p:notes xmlns:a="http://schemas.openxmlformats.org/drawingml/2006/main" xmlns:r="http://schemas.openxmlformats.org/officeDocument/2006/relationships" xmlns:p="http://schemas.openxmlformats.org/presentationml/2006/main">
+  <p:cSld>
+    <p:spTree>
+      <p:nvGrpSpPr>
+        <p:cNvPr id="1" name=""/>
+        <p:cNvGrpSpPr/>
+        <p:nvPr/>
+      </p:nvGrpSpPr>
+      <p:grpSpPr>
+        <a:xfrm>
+          <a:off x="0" y="0"/>
+          <a:ext cx="0" cy="0"/>
+          <a:chOff x="0" y="0"/>
+          <a:chExt cx="0" cy="0"/>
+        </a:xfrm>
+      </p:grpSpPr>
+      <p:sp>
+        <p:nvSpPr>
+          <p:cNvPr id="2" name="幻灯片图像占位符 1"/>
+          <p:cNvSpPr>
+            <a:spLocks noGrp="1" noRot="1" noChangeAspect="1"/>
+          </p:cNvSpPr>
+          <p:nvPr>
+            <p:ph type="sldImg"/>
+          </p:nvPr>
+        </p:nvSpPr>
+        <p:spPr/>
+      </p:sp>
+      <p:sp>
+        <p:nvSpPr>
+          <p:cNvPr id="3" name="备注占位符 2"/>
+          <p:cNvSpPr>
+            <a:spLocks noGrp="1"/>
+          </p:cNvSpPr>
+          <p:nvPr>
+            <p:ph type="body" idx="1"/>
+          </p:nvPr>
+        </p:nvSpPr>
+        <p:spPr/>
+        <p:txBody>
+          <a:bodyPr/>
+          <a:lstStyle/>
+          <a:p>
+            <a:r>
+              <a:rPr kumimoji="1" lang="zh-CN" altLang="en-US" dirty="0" smtClean="0"/>
+              <a:t>首先，讲</a:t>
+            </a:r>
+            <a:r>
+              <a:rPr kumimoji="1" lang="en-US" altLang="zh-CN" dirty="0" smtClean="0"/>
+              <a:t>Animator</a:t>
+            </a:r>
+            <a:endParaRPr kumimoji="1" lang="zh-CN" altLang="en-US" dirty="0" smtClean="0"/>
+          </a:p>
+          <a:p>
+            <a:r>
+              <a:rPr kumimoji="1" lang="en-US" altLang="zh-CN" dirty="0" smtClean="0"/>
+              <a:t>Animator</a:t>
+            </a:r>
+            <a:r>
+              <a:rPr kumimoji="1" lang="zh-CN" altLang="en-US" dirty="0" smtClean="0"/>
+              <a:t>，顾名思义，就是用来制作动画的</a:t>
+            </a:r>
+            <a:endParaRPr kumimoji="1" lang="en-US" altLang="zh-CN" dirty="0" smtClean="0"/>
+          </a:p>
+          <a:p>
+            <a:r>
+              <a:rPr kumimoji="1" lang="en-US" altLang="zh-CN" dirty="0" smtClean="0"/>
+              <a:t>Animator</a:t>
+            </a:r>
+            <a:r>
+              <a:rPr kumimoji="1" lang="zh-CN" altLang="en-US" dirty="0" smtClean="0"/>
+              <a:t>是这一系列的基类</a:t>
+            </a:r>
+          </a:p>
+          <a:p>
+            <a:endParaRPr kumimoji="1" lang="zh-CN" altLang="en-US" dirty="0"/>
+          </a:p>
+        </p:txBody>
+      </p:sp>
+      <p:sp>
+        <p:nvSpPr>
+          <p:cNvPr id="4" name="幻灯片编号占位符 3"/>
+          <p:cNvSpPr>
+            <a:spLocks noGrp="1"/>
+          </p:cNvSpPr>
+          <p:nvPr>
+            <p:ph type="sldNum" sz="quarter" idx="10"/>
+          </p:nvPr>
+        </p:nvSpPr>
+        <p:spPr/>
+        <p:txBody>
+          <a:bodyPr/>
+          <a:lstStyle/>
+          <a:p>
+            <a:fld id="{53190343-A285-E444-9B8B-A03A0DB5BFEC}" type="slidenum">
+              <a:rPr kumimoji="1" lang="zh-CN" altLang="en-US" smtClean="0"/>
+              <a:t>3</a:t>
+            </a:fld>
+            <a:endParaRPr kumimoji="1" lang="zh-CN" altLang="en-US"/>
+          </a:p>
+        </p:txBody>
+      </p:sp>
+    </p:spTree>
+    <p:extLst>
+      <p:ext uri="{BB962C8B-B14F-4D97-AF65-F5344CB8AC3E}">
+        <p14:creationId xmlns:p14="http://schemas.microsoft.com/office/powerpoint/2010/main" val="1369133069"/>
       </p:ext>
     </p:extLst>
   </p:cSld>
@@ -676,7 +890,7 @@
           <a:p>
             <a:fld id="{88050F38-946A-4344-8969-2030EF824029}" type="datetimeFigureOut">
               <a:rPr kumimoji="1" lang="zh-CN" altLang="en-US" smtClean="0"/>
-              <a:t>15/10/24</a:t>
+              <a:t>15/10/26</a:t>
             </a:fld>
             <a:endParaRPr kumimoji="1" lang="zh-CN" altLang="en-US"/>
           </a:p>
@@ -846,7 +1060,7 @@
           <a:p>
             <a:fld id="{88050F38-946A-4344-8969-2030EF824029}" type="datetimeFigureOut">
               <a:rPr kumimoji="1" lang="zh-CN" altLang="en-US" smtClean="0"/>
-              <a:t>15/10/24</a:t>
+              <a:t>15/10/26</a:t>
             </a:fld>
             <a:endParaRPr kumimoji="1" lang="zh-CN" altLang="en-US"/>
           </a:p>
@@ -1026,7 +1240,7 @@
           <a:p>
             <a:fld id="{88050F38-946A-4344-8969-2030EF824029}" type="datetimeFigureOut">
               <a:rPr kumimoji="1" lang="zh-CN" altLang="en-US" smtClean="0"/>
-              <a:t>15/10/24</a:t>
+              <a:t>15/10/26</a:t>
             </a:fld>
             <a:endParaRPr kumimoji="1" lang="zh-CN" altLang="en-US"/>
           </a:p>
@@ -1196,7 +1410,7 @@
           <a:p>
             <a:fld id="{88050F38-946A-4344-8969-2030EF824029}" type="datetimeFigureOut">
               <a:rPr kumimoji="1" lang="zh-CN" altLang="en-US" smtClean="0"/>
-              <a:t>15/10/24</a:t>
+              <a:t>15/10/26</a:t>
             </a:fld>
             <a:endParaRPr kumimoji="1" lang="zh-CN" altLang="en-US"/>
           </a:p>
@@ -1442,7 +1656,7 @@
           <a:p>
             <a:fld id="{88050F38-946A-4344-8969-2030EF824029}" type="datetimeFigureOut">
               <a:rPr kumimoji="1" lang="zh-CN" altLang="en-US" smtClean="0"/>
-              <a:t>15/10/24</a:t>
+              <a:t>15/10/26</a:t>
             </a:fld>
             <a:endParaRPr kumimoji="1" lang="zh-CN" altLang="en-US"/>
           </a:p>
@@ -1674,7 +1888,7 @@
           <a:p>
             <a:fld id="{88050F38-946A-4344-8969-2030EF824029}" type="datetimeFigureOut">
               <a:rPr kumimoji="1" lang="zh-CN" altLang="en-US" smtClean="0"/>
-              <a:t>15/10/24</a:t>
+              <a:t>15/10/26</a:t>
             </a:fld>
             <a:endParaRPr kumimoji="1" lang="zh-CN" altLang="en-US"/>
           </a:p>
@@ -2041,7 +2255,7 @@
           <a:p>
             <a:fld id="{88050F38-946A-4344-8969-2030EF824029}" type="datetimeFigureOut">
               <a:rPr kumimoji="1" lang="zh-CN" altLang="en-US" smtClean="0"/>
-              <a:t>15/10/24</a:t>
+              <a:t>15/10/26</a:t>
             </a:fld>
             <a:endParaRPr kumimoji="1" lang="zh-CN" altLang="en-US"/>
           </a:p>
@@ -2159,7 +2373,7 @@
           <a:p>
             <a:fld id="{88050F38-946A-4344-8969-2030EF824029}" type="datetimeFigureOut">
               <a:rPr kumimoji="1" lang="zh-CN" altLang="en-US" smtClean="0"/>
-              <a:t>15/10/24</a:t>
+              <a:t>15/10/26</a:t>
             </a:fld>
             <a:endParaRPr kumimoji="1" lang="zh-CN" altLang="en-US"/>
           </a:p>
@@ -2254,7 +2468,7 @@
           <a:p>
             <a:fld id="{88050F38-946A-4344-8969-2030EF824029}" type="datetimeFigureOut">
               <a:rPr kumimoji="1" lang="zh-CN" altLang="en-US" smtClean="0"/>
-              <a:t>15/10/24</a:t>
+              <a:t>15/10/26</a:t>
             </a:fld>
             <a:endParaRPr kumimoji="1" lang="zh-CN" altLang="en-US"/>
           </a:p>
@@ -2531,7 +2745,7 @@
           <a:p>
             <a:fld id="{88050F38-946A-4344-8969-2030EF824029}" type="datetimeFigureOut">
               <a:rPr kumimoji="1" lang="zh-CN" altLang="en-US" smtClean="0"/>
-              <a:t>15/10/24</a:t>
+              <a:t>15/10/26</a:t>
             </a:fld>
             <a:endParaRPr kumimoji="1" lang="zh-CN" altLang="en-US"/>
           </a:p>
@@ -2784,7 +2998,7 @@
           <a:p>
             <a:fld id="{88050F38-946A-4344-8969-2030EF824029}" type="datetimeFigureOut">
               <a:rPr kumimoji="1" lang="zh-CN" altLang="en-US" smtClean="0"/>
-              <a:t>15/10/24</a:t>
+              <a:t>15/10/26</a:t>
             </a:fld>
             <a:endParaRPr kumimoji="1" lang="zh-CN" altLang="en-US"/>
           </a:p>
@@ -2997,7 +3211,7 @@
           <a:p>
             <a:fld id="{88050F38-946A-4344-8969-2030EF824029}" type="datetimeFigureOut">
               <a:rPr kumimoji="1" lang="zh-CN" altLang="en-US" smtClean="0"/>
-              <a:t>15/10/24</a:t>
+              <a:t>15/10/26</a:t>
             </a:fld>
             <a:endParaRPr kumimoji="1" lang="zh-CN" altLang="en-US"/>
           </a:p>
@@ -3491,6 +3705,85 @@
             <a:spLocks noGrp="1"/>
           </p:cNvSpPr>
           <p:nvPr>
+            <p:ph type="ctrTitle"/>
+          </p:nvPr>
+        </p:nvSpPr>
+        <p:spPr/>
+        <p:txBody>
+          <a:bodyPr/>
+          <a:lstStyle/>
+          <a:p>
+            <a:r>
+              <a:rPr kumimoji="1" lang="en-US" altLang="zh-CN" dirty="0" smtClean="0"/>
+              <a:t>Animator</a:t>
+            </a:r>
+            <a:endParaRPr kumimoji="1" lang="zh-CN" altLang="en-US" dirty="0"/>
+          </a:p>
+        </p:txBody>
+      </p:sp>
+      <p:sp>
+        <p:nvSpPr>
+          <p:cNvPr id="3" name="副标题 2"/>
+          <p:cNvSpPr>
+            <a:spLocks noGrp="1"/>
+          </p:cNvSpPr>
+          <p:nvPr>
+            <p:ph type="subTitle" idx="1"/>
+          </p:nvPr>
+        </p:nvSpPr>
+        <p:spPr/>
+        <p:txBody>
+          <a:bodyPr/>
+          <a:lstStyle/>
+          <a:p>
+            <a:endParaRPr kumimoji="1" lang="zh-CN" altLang="en-US"/>
+          </a:p>
+        </p:txBody>
+      </p:sp>
+    </p:spTree>
+    <p:extLst>
+      <p:ext uri="{BB962C8B-B14F-4D97-AF65-F5344CB8AC3E}">
+        <p14:creationId xmlns:p14="http://schemas.microsoft.com/office/powerpoint/2010/main" val="149798315"/>
+      </p:ext>
+    </p:extLst>
+  </p:cSld>
+  <p:clrMapOvr>
+    <a:masterClrMapping/>
+  </p:clrMapOvr>
+  <p:timing>
+    <p:tnLst>
+      <p:par>
+        <p:cTn id="1" dur="indefinite" restart="never" nodeType="tmRoot"/>
+      </p:par>
+    </p:tnLst>
+  </p:timing>
+</p:sld>
+</file>
+
+<file path=ppt/slides/slide3.xml><?xml version="1.0" encoding="utf-8"?>
+<p:sld xmlns:a="http://schemas.openxmlformats.org/drawingml/2006/main" xmlns:r="http://schemas.openxmlformats.org/officeDocument/2006/relationships" xmlns:p="http://schemas.openxmlformats.org/presentationml/2006/main">
+  <p:cSld>
+    <p:spTree>
+      <p:nvGrpSpPr>
+        <p:cNvPr id="1" name=""/>
+        <p:cNvGrpSpPr/>
+        <p:nvPr/>
+      </p:nvGrpSpPr>
+      <p:grpSpPr>
+        <a:xfrm>
+          <a:off x="0" y="0"/>
+          <a:ext cx="0" cy="0"/>
+          <a:chOff x="0" y="0"/>
+          <a:chExt cx="0" cy="0"/>
+        </a:xfrm>
+      </p:grpSpPr>
+      <p:sp>
+        <p:nvSpPr>
+          <p:cNvPr id="2" name="标题 1"/>
+          <p:cNvSpPr>
+            <a:spLocks noGrp="1"/>
+          </p:cNvSpPr>
+          <p:nvPr>
             <p:ph type="title"/>
           </p:nvPr>
         </p:nvSpPr>
@@ -3499,29 +3792,38 @@
           <a:bodyPr/>
           <a:lstStyle/>
           <a:p>
-            <a:endParaRPr kumimoji="1" lang="zh-CN" altLang="en-US"/>
-          </a:p>
-        </p:txBody>
-      </p:sp>
-      <p:sp>
-        <p:nvSpPr>
-          <p:cNvPr id="3" name="内容占位符 2"/>
-          <p:cNvSpPr>
-            <a:spLocks noGrp="1"/>
-          </p:cNvSpPr>
-          <p:nvPr>
-            <p:ph idx="1"/>
-          </p:nvPr>
-        </p:nvSpPr>
-        <p:spPr/>
-        <p:txBody>
-          <a:bodyPr/>
-          <a:lstStyle/>
-          <a:p>
-            <a:endParaRPr kumimoji="1" lang="zh-CN" altLang="en-US"/>
-          </a:p>
-        </p:txBody>
-      </p:sp>
+            <a:r>
+              <a:rPr kumimoji="1" lang="en-US" altLang="zh-CN" dirty="0" smtClean="0"/>
+              <a:t>Animator</a:t>
+            </a:r>
+            <a:endParaRPr kumimoji="1" lang="zh-CN" altLang="en-US" dirty="0"/>
+          </a:p>
+        </p:txBody>
+      </p:sp>
+      <p:pic>
+        <p:nvPicPr>
+          <p:cNvPr id="4" name="图片 3"/>
+          <p:cNvPicPr>
+            <a:picLocks noChangeAspect="1"/>
+          </p:cNvPicPr>
+          <p:nvPr/>
+        </p:nvPicPr>
+        <p:blipFill>
+          <a:blip r:embed="rId3"/>
+          <a:stretch>
+            <a:fillRect/>
+          </a:stretch>
+        </p:blipFill>
+        <p:spPr>
+          <a:xfrm>
+            <a:off x="2257425" y="2082800"/>
+            <a:ext cx="8191500" cy="3670300"/>
+          </a:xfrm>
+          <a:prstGeom prst="rect">
+            <a:avLst/>
+          </a:prstGeom>
+        </p:spPr>
+      </p:pic>
     </p:spTree>
     <p:extLst>
       <p:ext uri="{BB962C8B-B14F-4D97-AF65-F5344CB8AC3E}">
@@ -3535,6 +3837,318 @@
   <p:transition spd="med">
     <p:pull/>
   </p:transition>
+  <p:timing>
+    <p:tnLst>
+      <p:par>
+        <p:cTn id="1" dur="indefinite" restart="never" nodeType="tmRoot"/>
+      </p:par>
+    </p:tnLst>
+  </p:timing>
+</p:sld>
+</file>
+
+<file path=ppt/slides/slide4.xml><?xml version="1.0" encoding="utf-8"?>
+<p:sld xmlns:a="http://schemas.openxmlformats.org/drawingml/2006/main" xmlns:r="http://schemas.openxmlformats.org/officeDocument/2006/relationships" xmlns:p="http://schemas.openxmlformats.org/presentationml/2006/main">
+  <p:cSld>
+    <p:spTree>
+      <p:nvGrpSpPr>
+        <p:cNvPr id="1" name=""/>
+        <p:cNvGrpSpPr/>
+        <p:nvPr/>
+      </p:nvGrpSpPr>
+      <p:grpSpPr>
+        <a:xfrm>
+          <a:off x="0" y="0"/>
+          <a:ext cx="0" cy="0"/>
+          <a:chOff x="0" y="0"/>
+          <a:chExt cx="0" cy="0"/>
+        </a:xfrm>
+      </p:grpSpPr>
+      <p:sp>
+        <p:nvSpPr>
+          <p:cNvPr id="2" name="标题 1"/>
+          <p:cNvSpPr>
+            <a:spLocks noGrp="1"/>
+          </p:cNvSpPr>
+          <p:nvPr>
+            <p:ph type="title"/>
+          </p:nvPr>
+        </p:nvSpPr>
+        <p:spPr/>
+        <p:txBody>
+          <a:bodyPr/>
+          <a:lstStyle/>
+          <a:p>
+            <a:endParaRPr kumimoji="1" lang="zh-CN" altLang="en-US"/>
+          </a:p>
+        </p:txBody>
+      </p:sp>
+      <p:sp>
+        <p:nvSpPr>
+          <p:cNvPr id="3" name="图片占位符 2"/>
+          <p:cNvSpPr>
+            <a:spLocks noGrp="1"/>
+          </p:cNvSpPr>
+          <p:nvPr>
+            <p:ph type="pic" idx="1"/>
+          </p:nvPr>
+        </p:nvSpPr>
+        <p:spPr/>
+      </p:sp>
+      <p:sp>
+        <p:nvSpPr>
+          <p:cNvPr id="4" name="文本占位符 3"/>
+          <p:cNvSpPr>
+            <a:spLocks noGrp="1"/>
+          </p:cNvSpPr>
+          <p:nvPr>
+            <p:ph type="body" sz="half" idx="2"/>
+          </p:nvPr>
+        </p:nvSpPr>
+        <p:spPr/>
+        <p:txBody>
+          <a:bodyPr/>
+          <a:lstStyle/>
+          <a:p>
+            <a:endParaRPr kumimoji="1" lang="zh-CN" altLang="en-US"/>
+          </a:p>
+        </p:txBody>
+      </p:sp>
+    </p:spTree>
+    <p:extLst>
+      <p:ext uri="{BB962C8B-B14F-4D97-AF65-F5344CB8AC3E}">
+        <p14:creationId xmlns:p14="http://schemas.microsoft.com/office/powerpoint/2010/main" val="294702567"/>
+      </p:ext>
+    </p:extLst>
+  </p:cSld>
+  <p:clrMapOvr>
+    <a:masterClrMapping/>
+  </p:clrMapOvr>
+  <p:timing>
+    <p:tnLst>
+      <p:par>
+        <p:cTn id="1" dur="indefinite" restart="never" nodeType="tmRoot"/>
+      </p:par>
+    </p:tnLst>
+  </p:timing>
+</p:sld>
+</file>
+
+<file path=ppt/slides/slide5.xml><?xml version="1.0" encoding="utf-8"?>
+<p:sld xmlns:a="http://schemas.openxmlformats.org/drawingml/2006/main" xmlns:r="http://schemas.openxmlformats.org/officeDocument/2006/relationships" xmlns:p="http://schemas.openxmlformats.org/presentationml/2006/main">
+  <p:cSld>
+    <p:spTree>
+      <p:nvGrpSpPr>
+        <p:cNvPr id="1" name=""/>
+        <p:cNvGrpSpPr/>
+        <p:nvPr/>
+      </p:nvGrpSpPr>
+      <p:grpSpPr>
+        <a:xfrm>
+          <a:off x="0" y="0"/>
+          <a:ext cx="0" cy="0"/>
+          <a:chOff x="0" y="0"/>
+          <a:chExt cx="0" cy="0"/>
+        </a:xfrm>
+      </p:grpSpPr>
+      <p:sp>
+        <p:nvSpPr>
+          <p:cNvPr id="2" name="标题 1"/>
+          <p:cNvSpPr>
+            <a:spLocks noGrp="1"/>
+          </p:cNvSpPr>
+          <p:nvPr>
+            <p:ph type="title"/>
+          </p:nvPr>
+        </p:nvSpPr>
+        <p:spPr/>
+        <p:txBody>
+          <a:bodyPr/>
+          <a:lstStyle/>
+          <a:p>
+            <a:endParaRPr kumimoji="1" lang="zh-CN" altLang="en-US"/>
+          </a:p>
+        </p:txBody>
+      </p:sp>
+      <p:sp>
+        <p:nvSpPr>
+          <p:cNvPr id="3" name="文本占位符 2"/>
+          <p:cNvSpPr>
+            <a:spLocks noGrp="1"/>
+          </p:cNvSpPr>
+          <p:nvPr>
+            <p:ph type="body" idx="1"/>
+          </p:nvPr>
+        </p:nvSpPr>
+        <p:spPr/>
+        <p:txBody>
+          <a:bodyPr/>
+          <a:lstStyle/>
+          <a:p>
+            <a:endParaRPr kumimoji="1" lang="zh-CN" altLang="en-US"/>
+          </a:p>
+        </p:txBody>
+      </p:sp>
+    </p:spTree>
+    <p:extLst>
+      <p:ext uri="{BB962C8B-B14F-4D97-AF65-F5344CB8AC3E}">
+        <p14:creationId xmlns:p14="http://schemas.microsoft.com/office/powerpoint/2010/main" val="596516649"/>
+      </p:ext>
+    </p:extLst>
+  </p:cSld>
+  <p:clrMapOvr>
+    <a:masterClrMapping/>
+  </p:clrMapOvr>
+  <p:timing>
+    <p:tnLst>
+      <p:par>
+        <p:cTn id="1" dur="indefinite" restart="never" nodeType="tmRoot"/>
+      </p:par>
+    </p:tnLst>
+  </p:timing>
+</p:sld>
+</file>
+
+<file path=ppt/slides/slide6.xml><?xml version="1.0" encoding="utf-8"?>
+<p:sld xmlns:a="http://schemas.openxmlformats.org/drawingml/2006/main" xmlns:r="http://schemas.openxmlformats.org/officeDocument/2006/relationships" xmlns:p="http://schemas.openxmlformats.org/presentationml/2006/main">
+  <p:cSld>
+    <p:spTree>
+      <p:nvGrpSpPr>
+        <p:cNvPr id="1" name=""/>
+        <p:cNvGrpSpPr/>
+        <p:nvPr/>
+      </p:nvGrpSpPr>
+      <p:grpSpPr>
+        <a:xfrm>
+          <a:off x="0" y="0"/>
+          <a:ext cx="0" cy="0"/>
+          <a:chOff x="0" y="0"/>
+          <a:chExt cx="0" cy="0"/>
+        </a:xfrm>
+      </p:grpSpPr>
+      <p:sp>
+        <p:nvSpPr>
+          <p:cNvPr id="2" name="标题 1"/>
+          <p:cNvSpPr>
+            <a:spLocks noGrp="1"/>
+          </p:cNvSpPr>
+          <p:nvPr>
+            <p:ph type="title"/>
+          </p:nvPr>
+        </p:nvSpPr>
+        <p:spPr/>
+        <p:txBody>
+          <a:bodyPr/>
+          <a:lstStyle/>
+          <a:p>
+            <a:endParaRPr kumimoji="1" lang="zh-CN" altLang="en-US"/>
+          </a:p>
+        </p:txBody>
+      </p:sp>
+      <p:sp>
+        <p:nvSpPr>
+          <p:cNvPr id="3" name="内容占位符 2"/>
+          <p:cNvSpPr>
+            <a:spLocks noGrp="1"/>
+          </p:cNvSpPr>
+          <p:nvPr>
+            <p:ph idx="1"/>
+          </p:nvPr>
+        </p:nvSpPr>
+        <p:spPr/>
+        <p:txBody>
+          <a:bodyPr/>
+          <a:lstStyle/>
+          <a:p>
+            <a:endParaRPr kumimoji="1" lang="zh-CN" altLang="en-US"/>
+          </a:p>
+        </p:txBody>
+      </p:sp>
+    </p:spTree>
+    <p:extLst>
+      <p:ext uri="{BB962C8B-B14F-4D97-AF65-F5344CB8AC3E}">
+        <p14:creationId xmlns:p14="http://schemas.microsoft.com/office/powerpoint/2010/main" val="1957747793"/>
+      </p:ext>
+    </p:extLst>
+  </p:cSld>
+  <p:clrMapOvr>
+    <a:masterClrMapping/>
+  </p:clrMapOvr>
+  <p:timing>
+    <p:tnLst>
+      <p:par>
+        <p:cTn id="1" dur="indefinite" restart="never" nodeType="tmRoot"/>
+      </p:par>
+    </p:tnLst>
+  </p:timing>
+</p:sld>
+</file>
+
+<file path=ppt/slides/slide7.xml><?xml version="1.0" encoding="utf-8"?>
+<p:sld xmlns:a="http://schemas.openxmlformats.org/drawingml/2006/main" xmlns:r="http://schemas.openxmlformats.org/officeDocument/2006/relationships" xmlns:p="http://schemas.openxmlformats.org/presentationml/2006/main">
+  <p:cSld>
+    <p:spTree>
+      <p:nvGrpSpPr>
+        <p:cNvPr id="1" name=""/>
+        <p:cNvGrpSpPr/>
+        <p:nvPr/>
+      </p:nvGrpSpPr>
+      <p:grpSpPr>
+        <a:xfrm>
+          <a:off x="0" y="0"/>
+          <a:ext cx="0" cy="0"/>
+          <a:chOff x="0" y="0"/>
+          <a:chExt cx="0" cy="0"/>
+        </a:xfrm>
+      </p:grpSpPr>
+      <p:sp>
+        <p:nvSpPr>
+          <p:cNvPr id="2" name="标题 1"/>
+          <p:cNvSpPr>
+            <a:spLocks noGrp="1"/>
+          </p:cNvSpPr>
+          <p:nvPr>
+            <p:ph type="ctrTitle"/>
+          </p:nvPr>
+        </p:nvSpPr>
+        <p:spPr/>
+        <p:txBody>
+          <a:bodyPr/>
+          <a:lstStyle/>
+          <a:p>
+            <a:endParaRPr kumimoji="1" lang="zh-CN" altLang="en-US"/>
+          </a:p>
+        </p:txBody>
+      </p:sp>
+      <p:sp>
+        <p:nvSpPr>
+          <p:cNvPr id="3" name="副标题 2"/>
+          <p:cNvSpPr>
+            <a:spLocks noGrp="1"/>
+          </p:cNvSpPr>
+          <p:nvPr>
+            <p:ph type="subTitle" idx="1"/>
+          </p:nvPr>
+        </p:nvSpPr>
+        <p:spPr/>
+        <p:txBody>
+          <a:bodyPr/>
+          <a:lstStyle/>
+          <a:p>
+            <a:endParaRPr kumimoji="1" lang="zh-CN" altLang="en-US"/>
+          </a:p>
+        </p:txBody>
+      </p:sp>
+    </p:spTree>
+    <p:extLst>
+      <p:ext uri="{BB962C8B-B14F-4D97-AF65-F5344CB8AC3E}">
+        <p14:creationId xmlns:p14="http://schemas.microsoft.com/office/powerpoint/2010/main" val="719885386"/>
+      </p:ext>
+    </p:extLst>
+  </p:cSld>
+  <p:clrMapOvr>
+    <a:masterClrMapping/>
+  </p:clrMapOvr>
   <p:timing>
     <p:tnLst>
       <p:par>

</xml_diff>